<commit_message>
Doc: update image files.
</commit_message>
<xml_diff>
--- a/doc.ja/src/figures/pgpool_on_k8s.pptx
+++ b/doc.ja/src/figures/pgpool_on_k8s.pptx
@@ -227,7 +227,7 @@
           <a:p>
             <a:fld id="{20DF3CB4-BB90-4C74-B20C-F740B87EB5A6}" type="datetimeFigureOut">
               <a:rPr kumimoji="1" lang="ja-JP" altLang="en-US" smtClean="0"/>
-              <a:t>2020/11/25</a:t>
+              <a:t>2020/11/26</a:t>
             </a:fld>
             <a:endParaRPr kumimoji="1" lang="ja-JP" altLang="en-US"/>
           </a:p>
@@ -404,7 +404,7 @@
           <a:p>
             <a:fld id="{D7D671B5-D0F9-4865-B46D-52F452CC7533}" type="datetimeFigureOut">
               <a:rPr kumimoji="1" lang="ja-JP" altLang="en-US" smtClean="0"/>
-              <a:t>2020/11/25</a:t>
+              <a:t>2020/11/26</a:t>
             </a:fld>
             <a:endParaRPr kumimoji="1" lang="ja-JP" altLang="en-US"/>
           </a:p>
@@ -747,523 +747,6 @@
           <a:bodyPr/>
           <a:lstStyle/>
           <a:p>
-            <a:r>
-              <a:rPr kumimoji="1" lang="ja-JP" altLang="en-US" dirty="0"/>
-              <a:t>続いて、</a:t>
-            </a:r>
-            <a:r>
-              <a:rPr kumimoji="1" lang="en-US" altLang="ja-JP" dirty="0"/>
-              <a:t>Kubernetes</a:t>
-            </a:r>
-            <a:r>
-              <a:rPr kumimoji="1" lang="ja-JP" altLang="en-US" dirty="0"/>
-              <a:t>で</a:t>
-            </a:r>
-            <a:r>
-              <a:rPr kumimoji="1" lang="en-US" altLang="ja-JP" dirty="0"/>
-              <a:t>Pgpool </a:t>
-            </a:r>
-            <a:r>
-              <a:rPr kumimoji="1" lang="ja-JP" altLang="en-US" dirty="0"/>
-              <a:t>を利用する際の全体構成図です。</a:t>
-            </a:r>
-            <a:endParaRPr kumimoji="1" lang="en-US" altLang="ja-JP" dirty="0"/>
-          </a:p>
-          <a:p>
-            <a:endParaRPr kumimoji="1" lang="en-US" altLang="ja-JP" dirty="0"/>
-          </a:p>
-          <a:p>
-            <a:r>
-              <a:rPr kumimoji="1" lang="ja-JP" altLang="en-US" dirty="0"/>
-              <a:t>ここは１つの</a:t>
-            </a:r>
-            <a:r>
-              <a:rPr kumimoji="1" lang="en-US" altLang="ja-JP" dirty="0"/>
-              <a:t>Kubernetes</a:t>
-            </a:r>
-            <a:r>
-              <a:rPr kumimoji="1" lang="ja-JP" altLang="en-US" dirty="0"/>
-              <a:t>クラスタで、クラスタの中に、</a:t>
-            </a:r>
-            <a:r>
-              <a:rPr kumimoji="1" lang="en-US" altLang="ja-JP" dirty="0"/>
-              <a:t>PostgreSQL Operator</a:t>
-            </a:r>
-            <a:r>
-              <a:rPr kumimoji="1" lang="ja-JP" altLang="en-US" dirty="0"/>
-              <a:t> と </a:t>
-            </a:r>
-            <a:r>
-              <a:rPr kumimoji="1" lang="en-US" altLang="ja-JP" dirty="0" err="1"/>
-              <a:t>pgpool</a:t>
-            </a:r>
-            <a:r>
-              <a:rPr kumimoji="1" lang="en-US" altLang="ja-JP" dirty="0"/>
-              <a:t> </a:t>
-            </a:r>
-            <a:r>
-              <a:rPr kumimoji="1" lang="ja-JP" altLang="en-US" dirty="0"/>
-              <a:t>の </a:t>
-            </a:r>
-            <a:r>
-              <a:rPr kumimoji="1" lang="en-US" altLang="ja-JP" dirty="0"/>
-              <a:t>pod</a:t>
-            </a:r>
-            <a:r>
-              <a:rPr kumimoji="1" lang="ja-JP" altLang="en-US" dirty="0"/>
-              <a:t> がインストールされています。</a:t>
-            </a:r>
-            <a:endParaRPr kumimoji="1" lang="en-US" altLang="ja-JP" dirty="0"/>
-          </a:p>
-          <a:p>
-            <a:r>
-              <a:rPr kumimoji="1" lang="en-US" altLang="ja-JP" dirty="0"/>
-              <a:t>PostgreSQL</a:t>
-            </a:r>
-            <a:r>
-              <a:rPr kumimoji="1" lang="ja-JP" altLang="en-US" dirty="0"/>
-              <a:t> </a:t>
-            </a:r>
-            <a:r>
-              <a:rPr kumimoji="1" lang="en-US" altLang="ja-JP" dirty="0"/>
-              <a:t>Operator</a:t>
-            </a:r>
-            <a:r>
-              <a:rPr kumimoji="1" lang="ja-JP" altLang="en-US" dirty="0"/>
-              <a:t> が </a:t>
-            </a:r>
-            <a:r>
-              <a:rPr kumimoji="1" lang="en-US" altLang="ja-JP" dirty="0"/>
-              <a:t>PostgreSQL </a:t>
-            </a:r>
-            <a:r>
-              <a:rPr kumimoji="1" lang="ja-JP" altLang="en-US" dirty="0"/>
-              <a:t>クラスタの作成とか、管理とかを行っています。</a:t>
-            </a:r>
-          </a:p>
-          <a:p>
-            <a:r>
-              <a:rPr kumimoji="1" lang="en-US" altLang="ja-JP" dirty="0"/>
-              <a:t>PostgreSQL</a:t>
-            </a:r>
-            <a:r>
-              <a:rPr kumimoji="1" lang="ja-JP" altLang="en-US" dirty="0"/>
-              <a:t>クラスタでは、</a:t>
-            </a:r>
-            <a:r>
-              <a:rPr kumimoji="1" lang="en-US" altLang="ja-JP" dirty="0"/>
-              <a:t>1</a:t>
-            </a:r>
-            <a:r>
-              <a:rPr kumimoji="1" lang="ja-JP" altLang="en-US" dirty="0"/>
-              <a:t>台の</a:t>
-            </a:r>
-            <a:r>
-              <a:rPr kumimoji="1" lang="en-US" altLang="ja-JP" dirty="0"/>
-              <a:t>Primary</a:t>
-            </a:r>
-            <a:r>
-              <a:rPr kumimoji="1" lang="ja-JP" altLang="en-US" dirty="0"/>
-              <a:t>と複数台の</a:t>
-            </a:r>
-            <a:r>
-              <a:rPr kumimoji="1" lang="en-US" altLang="ja-JP" dirty="0"/>
-              <a:t>Replica</a:t>
-            </a:r>
-            <a:r>
-              <a:rPr kumimoji="1" lang="ja-JP" altLang="en-US" dirty="0"/>
-              <a:t>が</a:t>
-            </a:r>
-            <a:r>
-              <a:rPr kumimoji="1" lang="en-US" altLang="ja-JP" dirty="0"/>
-              <a:t>Streaming replication </a:t>
-            </a:r>
-            <a:r>
-              <a:rPr kumimoji="1" lang="ja-JP" altLang="en-US" dirty="0"/>
-              <a:t>を構成しています。</a:t>
-            </a:r>
-            <a:endParaRPr kumimoji="1" lang="en-US" altLang="ja-JP" dirty="0"/>
-          </a:p>
-          <a:p>
-            <a:pPr marL="0" marR="0" lvl="0" indent="0" algn="l" defTabSz="914400" rtl="0" eaLnBrk="1" fontAlgn="auto" latinLnBrk="0" hangingPunct="1">
-              <a:lnSpc>
-                <a:spcPct val="100000"/>
-              </a:lnSpc>
-              <a:spcBef>
-                <a:spcPts val="0"/>
-              </a:spcBef>
-              <a:spcAft>
-                <a:spcPts val="0"/>
-              </a:spcAft>
-              <a:buClrTx/>
-              <a:buSzTx/>
-              <a:buFontTx/>
-              <a:buNone/>
-              <a:tabLst/>
-              <a:defRPr/>
-            </a:pPr>
-            <a:r>
-              <a:rPr kumimoji="1" lang="ja-JP" altLang="en-US" dirty="0"/>
-              <a:t>ここでは、</a:t>
-            </a:r>
-            <a:r>
-              <a:rPr kumimoji="1" lang="en-US" altLang="ja-JP" dirty="0"/>
-              <a:t>Primary pod </a:t>
-            </a:r>
-            <a:r>
-              <a:rPr kumimoji="1" lang="ja-JP" altLang="en-US" dirty="0"/>
-              <a:t>に対して</a:t>
-            </a:r>
-            <a:r>
-              <a:rPr kumimoji="1" lang="en-US" altLang="ja-JP" dirty="0"/>
-              <a:t>primary </a:t>
-            </a:r>
-            <a:r>
-              <a:rPr kumimoji="1" lang="ja-JP" altLang="en-US" dirty="0"/>
-              <a:t>用の </a:t>
-            </a:r>
-            <a:r>
-              <a:rPr kumimoji="1" lang="en-US" altLang="ja-JP" dirty="0"/>
-              <a:t>service</a:t>
-            </a:r>
-            <a:r>
-              <a:rPr kumimoji="1" lang="ja-JP" altLang="en-US" dirty="0"/>
-              <a:t>、複数の </a:t>
-            </a:r>
-            <a:r>
-              <a:rPr kumimoji="1" lang="en-US" altLang="ja-JP" dirty="0"/>
-              <a:t>replica </a:t>
-            </a:r>
-            <a:r>
-              <a:rPr kumimoji="1" lang="ja-JP" altLang="en-US" dirty="0"/>
-              <a:t>に対して </a:t>
-            </a:r>
-            <a:r>
-              <a:rPr kumimoji="1" lang="en-US" altLang="ja-JP" dirty="0"/>
-              <a:t>replica service</a:t>
-            </a:r>
-            <a:r>
-              <a:rPr kumimoji="1" lang="ja-JP" altLang="en-US" dirty="0"/>
-              <a:t>が作成されています。</a:t>
-            </a:r>
-            <a:endParaRPr kumimoji="1" lang="en-US" altLang="ja-JP" dirty="0"/>
-          </a:p>
-          <a:p>
-            <a:endParaRPr kumimoji="1" lang="en-US" altLang="ja-JP" dirty="0"/>
-          </a:p>
-          <a:p>
-            <a:r>
-              <a:rPr kumimoji="1" lang="en-US" altLang="ja-JP" dirty="0" err="1"/>
-              <a:t>pgpool</a:t>
-            </a:r>
-            <a:r>
-              <a:rPr kumimoji="1" lang="en-US" altLang="ja-JP" dirty="0"/>
-              <a:t> </a:t>
-            </a:r>
-            <a:r>
-              <a:rPr kumimoji="1" lang="ja-JP" altLang="en-US" dirty="0"/>
-              <a:t>が </a:t>
-            </a:r>
-            <a:r>
-              <a:rPr kumimoji="1" lang="en-US" altLang="ja-JP" dirty="0"/>
-              <a:t>primary DB</a:t>
-            </a:r>
-            <a:r>
-              <a:rPr kumimoji="1" lang="ja-JP" altLang="en-US" dirty="0"/>
-              <a:t> </a:t>
-            </a:r>
-            <a:r>
-              <a:rPr kumimoji="1" lang="en-US" altLang="ja-JP" dirty="0"/>
-              <a:t>service </a:t>
-            </a:r>
-            <a:r>
-              <a:rPr kumimoji="1" lang="ja-JP" altLang="en-US" dirty="0"/>
-              <a:t>と </a:t>
-            </a:r>
-            <a:r>
-              <a:rPr kumimoji="1" lang="en-US" altLang="ja-JP" dirty="0"/>
-              <a:t>replica DB </a:t>
-            </a:r>
-            <a:r>
-              <a:rPr kumimoji="1" lang="ja-JP" altLang="en-US" dirty="0"/>
-              <a:t> </a:t>
-            </a:r>
-            <a:r>
-              <a:rPr kumimoji="1" lang="en-US" altLang="ja-JP" dirty="0"/>
-              <a:t>service </a:t>
-            </a:r>
-            <a:r>
-              <a:rPr kumimoji="1" lang="ja-JP" altLang="en-US" dirty="0"/>
-              <a:t>に接続しています。</a:t>
-            </a:r>
-            <a:endParaRPr kumimoji="1" lang="en-US" altLang="ja-JP" dirty="0"/>
-          </a:p>
-          <a:p>
-            <a:endParaRPr kumimoji="1" lang="ja-JP" altLang="en-US" dirty="0"/>
-          </a:p>
-          <a:p>
-            <a:r>
-              <a:rPr kumimoji="1" lang="ja-JP" altLang="en-US" b="1" dirty="0">
-                <a:solidFill>
-                  <a:srgbClr val="EF8D4B"/>
-                </a:solidFill>
-              </a:rPr>
-              <a:t>また、</a:t>
-            </a:r>
-            <a:r>
-              <a:rPr kumimoji="1" lang="en-US" altLang="ja-JP" b="1" dirty="0">
-                <a:solidFill>
-                  <a:srgbClr val="EF8D4B"/>
-                </a:solidFill>
-              </a:rPr>
-              <a:t>service </a:t>
-            </a:r>
-            <a:r>
-              <a:rPr kumimoji="1" lang="ja-JP" altLang="en-US" b="1" dirty="0">
-                <a:solidFill>
-                  <a:srgbClr val="EF8D4B"/>
-                </a:solidFill>
-              </a:rPr>
-              <a:t>を使うことで、</a:t>
-            </a:r>
-            <a:r>
-              <a:rPr kumimoji="1" lang="en-US" altLang="ja-JP" b="1" dirty="0">
-                <a:solidFill>
-                  <a:srgbClr val="EF8D4B"/>
-                </a:solidFill>
-              </a:rPr>
-              <a:t>1</a:t>
-            </a:r>
-            <a:r>
-              <a:rPr kumimoji="1" lang="ja-JP" altLang="en-US" b="1" dirty="0">
-                <a:solidFill>
-                  <a:srgbClr val="EF8D4B"/>
-                </a:solidFill>
-              </a:rPr>
-              <a:t>つ大きなメリットが得られます。</a:t>
-            </a:r>
-          </a:p>
-          <a:p>
-            <a:r>
-              <a:rPr kumimoji="1" lang="ja-JP" altLang="en-US" b="1" dirty="0">
-                <a:solidFill>
-                  <a:srgbClr val="EF8D4B"/>
-                </a:solidFill>
-              </a:rPr>
-              <a:t>複数の </a:t>
-            </a:r>
-            <a:r>
-              <a:rPr kumimoji="1" lang="en-US" altLang="ja-JP" b="1" dirty="0">
-                <a:solidFill>
-                  <a:srgbClr val="EF8D4B"/>
-                </a:solidFill>
-              </a:rPr>
-              <a:t>Pod </a:t>
-            </a:r>
-            <a:r>
-              <a:rPr kumimoji="1" lang="ja-JP" altLang="en-US" b="1" dirty="0">
-                <a:solidFill>
-                  <a:srgbClr val="EF8D4B"/>
-                </a:solidFill>
-              </a:rPr>
-              <a:t>のセットに対して、</a:t>
-            </a:r>
-            <a:r>
-              <a:rPr kumimoji="1" lang="en-US" altLang="ja-JP" b="1" dirty="0">
-                <a:solidFill>
-                  <a:srgbClr val="EF8D4B"/>
-                </a:solidFill>
-              </a:rPr>
-              <a:t>service </a:t>
-            </a:r>
-            <a:r>
-              <a:rPr kumimoji="1" lang="ja-JP" altLang="en-US" b="1" dirty="0">
-                <a:solidFill>
-                  <a:srgbClr val="EF8D4B"/>
-                </a:solidFill>
-              </a:rPr>
-              <a:t>を作成すると、負荷分散も可能です。</a:t>
-            </a:r>
-            <a:endParaRPr kumimoji="1" lang="en-US" altLang="ja-JP" b="1" dirty="0">
-              <a:solidFill>
-                <a:srgbClr val="EF8D4B"/>
-              </a:solidFill>
-            </a:endParaRPr>
-          </a:p>
-          <a:p>
-            <a:endParaRPr kumimoji="1" lang="en-US" altLang="ja-JP" dirty="0"/>
-          </a:p>
-          <a:p>
-            <a:r>
-              <a:rPr kumimoji="1" lang="en-US" altLang="ja-JP" dirty="0" err="1"/>
-              <a:t>pgpool</a:t>
-            </a:r>
-            <a:r>
-              <a:rPr kumimoji="1" lang="en-US" altLang="ja-JP" dirty="0"/>
-              <a:t> </a:t>
-            </a:r>
-            <a:r>
-              <a:rPr kumimoji="1" lang="ja-JP" altLang="en-US" dirty="0"/>
-              <a:t>はどのようにクエリを振り分けているのかというと、</a:t>
-            </a:r>
-            <a:endParaRPr kumimoji="1" lang="en-US" altLang="ja-JP" dirty="0"/>
-          </a:p>
-          <a:p>
-            <a:r>
-              <a:rPr kumimoji="1" lang="ja-JP" altLang="en-US" dirty="0"/>
-              <a:t>クライアントが </a:t>
-            </a:r>
-            <a:r>
-              <a:rPr kumimoji="1" lang="en-US" altLang="ja-JP" dirty="0" err="1"/>
-              <a:t>pgpool</a:t>
-            </a:r>
-            <a:r>
-              <a:rPr kumimoji="1" lang="en-US" altLang="ja-JP" dirty="0"/>
-              <a:t> service </a:t>
-            </a:r>
-            <a:r>
-              <a:rPr kumimoji="1" lang="ja-JP" altLang="en-US" dirty="0"/>
-              <a:t>に対して、クエリを送信します。</a:t>
-            </a:r>
-            <a:endParaRPr kumimoji="1" lang="en-US" altLang="ja-JP" dirty="0"/>
-          </a:p>
-          <a:p>
-            <a:r>
-              <a:rPr kumimoji="1" lang="ja-JP" altLang="en-US" dirty="0"/>
-              <a:t>そして、</a:t>
-            </a:r>
-            <a:r>
-              <a:rPr kumimoji="1" lang="en-US" altLang="ja-JP" dirty="0" err="1"/>
-              <a:t>pgpool</a:t>
-            </a:r>
-            <a:r>
-              <a:rPr kumimoji="1" lang="en-US" altLang="ja-JP" dirty="0"/>
-              <a:t> </a:t>
-            </a:r>
-            <a:r>
-              <a:rPr kumimoji="1" lang="ja-JP" altLang="en-US" dirty="0"/>
-              <a:t>がクエリを解析して、もし更新クエリの場合は、</a:t>
-            </a:r>
-            <a:r>
-              <a:rPr kumimoji="1" lang="en-US" altLang="ja-JP" dirty="0"/>
-              <a:t>primary service </a:t>
-            </a:r>
-            <a:r>
-              <a:rPr kumimoji="1" lang="ja-JP" altLang="en-US" dirty="0"/>
-              <a:t>に対して送ります。参照クエリの場合は、</a:t>
-            </a:r>
-            <a:r>
-              <a:rPr kumimoji="1" lang="en-US" altLang="ja-JP" dirty="0"/>
-              <a:t>primary service </a:t>
-            </a:r>
-            <a:r>
-              <a:rPr kumimoji="1" lang="ja-JP" altLang="en-US" dirty="0"/>
-              <a:t>または </a:t>
-            </a:r>
-            <a:r>
-              <a:rPr kumimoji="1" lang="en-US" altLang="ja-JP" dirty="0"/>
-              <a:t>replica service </a:t>
-            </a:r>
-            <a:r>
-              <a:rPr kumimoji="1" lang="ja-JP" altLang="en-US" dirty="0"/>
-              <a:t>のいずれかに送ります。</a:t>
-            </a:r>
-          </a:p>
-          <a:p>
-            <a:r>
-              <a:rPr kumimoji="1" lang="ja-JP" altLang="en-US" dirty="0"/>
-              <a:t>また、</a:t>
-            </a:r>
-            <a:r>
-              <a:rPr kumimoji="1" lang="en-US" altLang="ja-JP" dirty="0"/>
-              <a:t>replica service </a:t>
-            </a:r>
-            <a:r>
-              <a:rPr kumimoji="1" lang="ja-JP" altLang="en-US" dirty="0"/>
-              <a:t>に対して送信された参照クエリが自動的に複数の </a:t>
-            </a:r>
-            <a:r>
-              <a:rPr kumimoji="1" lang="en-US" altLang="ja-JP" dirty="0"/>
-              <a:t>replica </a:t>
-            </a:r>
-            <a:r>
-              <a:rPr kumimoji="1" lang="ja-JP" altLang="en-US" dirty="0"/>
-              <a:t>間で負荷分散されます。</a:t>
-            </a:r>
-          </a:p>
-          <a:p>
-            <a:endParaRPr kumimoji="1" lang="en-US" altLang="ja-JP" dirty="0"/>
-          </a:p>
-          <a:p>
-            <a:r>
-              <a:rPr kumimoji="1" lang="ja-JP" altLang="en-US" dirty="0"/>
-              <a:t>さらに、モニタリング機能も利用できます。</a:t>
-            </a:r>
-            <a:endParaRPr kumimoji="1" lang="en-US" altLang="ja-JP" dirty="0"/>
-          </a:p>
-          <a:p>
-            <a:r>
-              <a:rPr kumimoji="1" lang="en-US" altLang="ja-JP" dirty="0"/>
-              <a:t>Kubernetes </a:t>
-            </a:r>
-            <a:r>
-              <a:rPr kumimoji="1" lang="ja-JP" altLang="en-US" dirty="0"/>
-              <a:t>では </a:t>
-            </a:r>
-            <a:r>
-              <a:rPr kumimoji="1" lang="en-US" altLang="ja-JP" dirty="0"/>
-              <a:t>Prometheus</a:t>
-            </a:r>
-            <a:r>
-              <a:rPr kumimoji="1" lang="ja-JP" altLang="en-US" dirty="0"/>
-              <a:t> を利用した監視がよく使われています。</a:t>
-            </a:r>
-            <a:endParaRPr kumimoji="1" lang="en-US" altLang="ja-JP" dirty="0"/>
-          </a:p>
-          <a:p>
-            <a:r>
-              <a:rPr kumimoji="1" lang="en-US" altLang="ja-JP" dirty="0"/>
-              <a:t>Prometheus </a:t>
-            </a:r>
-            <a:r>
-              <a:rPr kumimoji="1" lang="ja-JP" altLang="en-US" dirty="0"/>
-              <a:t>が </a:t>
-            </a:r>
-            <a:r>
-              <a:rPr kumimoji="1" lang="en-US" altLang="ja-JP" dirty="0" err="1"/>
-              <a:t>pgpool</a:t>
-            </a:r>
-            <a:r>
-              <a:rPr kumimoji="1" lang="en-US" altLang="ja-JP" dirty="0"/>
-              <a:t> exporter </a:t>
-            </a:r>
-            <a:r>
-              <a:rPr kumimoji="1" lang="ja-JP" altLang="en-US" dirty="0"/>
-              <a:t>と </a:t>
-            </a:r>
-            <a:r>
-              <a:rPr kumimoji="1" lang="en-US" altLang="ja-JP" dirty="0" err="1"/>
-              <a:t>postgres</a:t>
-            </a:r>
-            <a:r>
-              <a:rPr kumimoji="1" lang="en-US" altLang="ja-JP" dirty="0"/>
-              <a:t> exporter </a:t>
-            </a:r>
-            <a:r>
-              <a:rPr kumimoji="1" lang="ja-JP" altLang="en-US" dirty="0"/>
-              <a:t>から各種メトリクスを収集して、</a:t>
-            </a:r>
-            <a:r>
-              <a:rPr kumimoji="1" lang="en-US" altLang="ja-JP" dirty="0"/>
-              <a:t>Grafana </a:t>
-            </a:r>
-            <a:r>
-              <a:rPr kumimoji="1" lang="ja-JP" altLang="en-US" dirty="0"/>
-              <a:t>と連携して、収集したメトリクスを可視化します。</a:t>
-            </a:r>
-            <a:endParaRPr kumimoji="1" lang="en-US" altLang="ja-JP" dirty="0"/>
-          </a:p>
-          <a:p>
             <a:endParaRPr kumimoji="1" lang="en-US" altLang="ja-JP" dirty="0"/>
           </a:p>
         </p:txBody>
@@ -1469,7 +952,7 @@
             <a:fld id="{75FA00A3-8634-4916-BEF6-F445AD93DD15}" type="datetime1">
               <a:rPr lang="ja-JP" altLang="en-US" smtClean="0"/>
               <a:pPr/>
-              <a:t>2020/11/25</a:t>
+              <a:t>2020/11/26</a:t>
             </a:fld>
             <a:endParaRPr lang="ja-JP" altLang="en-US" dirty="0"/>
           </a:p>
@@ -1720,7 +1203,7 @@
           <a:p>
             <a:fld id="{078DFD50-B4CC-47E8-A074-1CF17765A665}" type="datetime1">
               <a:rPr kumimoji="1" lang="ja-JP" altLang="en-US" smtClean="0"/>
-              <a:t>2020/11/25</a:t>
+              <a:t>2020/11/26</a:t>
             </a:fld>
             <a:endParaRPr kumimoji="1" lang="ja-JP" altLang="en-US"/>
           </a:p>
@@ -1964,7 +1447,7 @@
           <a:p>
             <a:fld id="{3B655820-CC0E-437C-982E-135C217D8C65}" type="datetime1">
               <a:rPr kumimoji="1" lang="ja-JP" altLang="en-US" smtClean="0"/>
-              <a:t>2020/11/25</a:t>
+              <a:t>2020/11/26</a:t>
             </a:fld>
             <a:endParaRPr kumimoji="1" lang="ja-JP" altLang="en-US"/>
           </a:p>
@@ -2208,7 +1691,7 @@
           <a:p>
             <a:fld id="{9791AC32-A860-4F43-83DF-4462D1478A06}" type="datetime1">
               <a:rPr kumimoji="1" lang="ja-JP" altLang="en-US" smtClean="0"/>
-              <a:t>2020/11/25</a:t>
+              <a:t>2020/11/26</a:t>
             </a:fld>
             <a:endParaRPr kumimoji="1" lang="ja-JP" altLang="en-US"/>
           </a:p>
@@ -2369,7 +1852,7 @@
           <a:p>
             <a:fld id="{856BE52B-08BE-440F-9C7A-4E0B5E57E95B}" type="datetime1">
               <a:rPr kumimoji="1" lang="ja-JP" altLang="en-US" smtClean="0"/>
-              <a:t>2020/11/25</a:t>
+              <a:t>2020/11/26</a:t>
             </a:fld>
             <a:endParaRPr kumimoji="1" lang="ja-JP" altLang="en-US"/>
           </a:p>
@@ -2780,7 +2263,7 @@
           <a:p>
             <a:fld id="{28954A87-E76B-4693-839B-49F4CF49D508}" type="datetime1">
               <a:rPr kumimoji="1" lang="ja-JP" altLang="en-US" smtClean="0"/>
-              <a:t>2020/11/25</a:t>
+              <a:t>2020/11/26</a:t>
             </a:fld>
             <a:endParaRPr kumimoji="1" lang="ja-JP" altLang="en-US"/>
           </a:p>
@@ -3264,7 +2747,7 @@
           <a:p>
             <a:fld id="{51D81007-68A4-440B-AFB0-3EC9AE350C26}" type="datetime1">
               <a:rPr kumimoji="1" lang="ja-JP" altLang="en-US" smtClean="0"/>
-              <a:t>2020/11/25</a:t>
+              <a:t>2020/11/26</a:t>
             </a:fld>
             <a:endParaRPr kumimoji="1" lang="ja-JP" altLang="en-US"/>
           </a:p>
@@ -3409,7 +2892,7 @@
           <a:p>
             <a:fld id="{7476FAAC-AF53-40C2-8AF0-A7E7E44D2C08}" type="datetime1">
               <a:rPr kumimoji="1" lang="ja-JP" altLang="en-US" smtClean="0"/>
-              <a:t>2020/11/25</a:t>
+              <a:t>2020/11/26</a:t>
             </a:fld>
             <a:endParaRPr kumimoji="1" lang="ja-JP" altLang="en-US"/>
           </a:p>
@@ -3526,7 +3009,7 @@
           <a:p>
             <a:fld id="{49B8B002-5A45-45BC-817A-2B2B781858E3}" type="datetime1">
               <a:rPr kumimoji="1" lang="ja-JP" altLang="en-US" smtClean="0"/>
-              <a:t>2020/11/25</a:t>
+              <a:t>2020/11/26</a:t>
             </a:fld>
             <a:endParaRPr kumimoji="1" lang="ja-JP" altLang="en-US"/>
           </a:p>
@@ -3879,7 +3362,7 @@
           <a:p>
             <a:fld id="{57439978-10C6-4D3E-B00B-BC4F1A8DEEEE}" type="datetime1">
               <a:rPr kumimoji="1" lang="ja-JP" altLang="en-US" smtClean="0"/>
-              <a:t>2020/11/25</a:t>
+              <a:t>2020/11/26</a:t>
             </a:fld>
             <a:endParaRPr kumimoji="1" lang="ja-JP" altLang="en-US"/>
           </a:p>
@@ -4177,7 +3660,7 @@
           <a:p>
             <a:fld id="{571980EB-3352-4AB0-B09E-0F90D37CE7B7}" type="datetime1">
               <a:rPr kumimoji="1" lang="ja-JP" altLang="en-US" smtClean="0"/>
-              <a:t>2020/11/25</a:t>
+              <a:t>2020/11/26</a:t>
             </a:fld>
             <a:endParaRPr kumimoji="1" lang="ja-JP" altLang="en-US"/>
           </a:p>
@@ -4692,7 +4175,7 @@
           <a:p>
             <a:fld id="{1D69496E-5672-4AC0-AD25-47F6D4B30E88}" type="datetime1">
               <a:rPr kumimoji="1" lang="ja-JP" altLang="en-US" smtClean="0"/>
-              <a:t>2020/11/25</a:t>
+              <a:t>2020/11/26</a:t>
             </a:fld>
             <a:endParaRPr kumimoji="1" lang="ja-JP" altLang="en-US"/>
           </a:p>

</xml_diff>